<commit_message>
Fixed exercises in references section of slides
</commit_message>
<xml_diff>
--- a/presentation/git_internals.pptx
+++ b/presentation/git_internals.pptx
@@ -4108,7 +4108,7 @@
           <p:cNvPr id="2" name="Title 1">
             <a:extLst>
               <a:ext uri="{FF2B5EF4-FFF2-40B4-BE49-F238E27FC236}">
-                <a16:creationId xmlns:a16="http://schemas.microsoft.com/office/drawing/2014/main" xmlns="" id="{16917E76-2EAF-4B52-A7CC-3673B4ACF9C8}"/>
+                <a16:creationId xmlns="" xmlns:a16="http://schemas.microsoft.com/office/drawing/2014/main" id="{16917E76-2EAF-4B52-A7CC-3673B4ACF9C8}"/>
               </a:ext>
             </a:extLst>
           </p:cNvPr>
@@ -4143,7 +4143,7 @@
           <p:cNvPr id="3" name="Subtitle 2">
             <a:extLst>
               <a:ext uri="{FF2B5EF4-FFF2-40B4-BE49-F238E27FC236}">
-                <a16:creationId xmlns:a16="http://schemas.microsoft.com/office/drawing/2014/main" xmlns="" id="{518F03B8-4DD1-4719-A5DE-09F5A3BDCF32}"/>
+                <a16:creationId xmlns="" xmlns:a16="http://schemas.microsoft.com/office/drawing/2014/main" id="{518F03B8-4DD1-4719-A5DE-09F5A3BDCF32}"/>
               </a:ext>
             </a:extLst>
           </p:cNvPr>
@@ -4185,7 +4185,7 @@
           <p:cNvPr id="15" name="Picture 14">
             <a:extLst>
               <a:ext uri="{FF2B5EF4-FFF2-40B4-BE49-F238E27FC236}">
-                <a16:creationId xmlns:a16="http://schemas.microsoft.com/office/drawing/2014/main" xmlns="" id="{66C89D87-286B-433A-A69C-2560881634ED}"/>
+                <a16:creationId xmlns="" xmlns:a16="http://schemas.microsoft.com/office/drawing/2014/main" id="{66C89D87-286B-433A-A69C-2560881634ED}"/>
               </a:ext>
             </a:extLst>
           </p:cNvPr>
@@ -4222,7 +4222,7 @@
           <p:cNvPr id="16" name="TextBox 15">
             <a:extLst>
               <a:ext uri="{FF2B5EF4-FFF2-40B4-BE49-F238E27FC236}">
-                <a16:creationId xmlns:a16="http://schemas.microsoft.com/office/drawing/2014/main" xmlns="" id="{8D66B411-4137-4EFB-8450-B0AD18CC83C0}"/>
+                <a16:creationId xmlns="" xmlns:a16="http://schemas.microsoft.com/office/drawing/2014/main" id="{8D66B411-4137-4EFB-8450-B0AD18CC83C0}"/>
               </a:ext>
             </a:extLst>
           </p:cNvPr>
@@ -4259,7 +4259,7 @@
           <p:cNvPr id="17" name="TextBox 16">
             <a:extLst>
               <a:ext uri="{FF2B5EF4-FFF2-40B4-BE49-F238E27FC236}">
-                <a16:creationId xmlns:a16="http://schemas.microsoft.com/office/drawing/2014/main" xmlns="" id="{A393B127-BD63-42C8-9CD5-C93B21548F5A}"/>
+                <a16:creationId xmlns="" xmlns:a16="http://schemas.microsoft.com/office/drawing/2014/main" id="{A393B127-BD63-42C8-9CD5-C93B21548F5A}"/>
               </a:ext>
             </a:extLst>
           </p:cNvPr>
@@ -4327,7 +4327,7 @@
           <p:cNvPr id="2" name="Title 1">
             <a:extLst>
               <a:ext uri="{FF2B5EF4-FFF2-40B4-BE49-F238E27FC236}">
-                <a16:creationId xmlns:a16="http://schemas.microsoft.com/office/drawing/2014/main" xmlns="" id="{393C3BFF-ABD6-478B-8B87-53CF24BDCC5C}"/>
+                <a16:creationId xmlns="" xmlns:a16="http://schemas.microsoft.com/office/drawing/2014/main" id="{393C3BFF-ABD6-478B-8B87-53CF24BDCC5C}"/>
               </a:ext>
             </a:extLst>
           </p:cNvPr>
@@ -4356,7 +4356,7 @@
           <p:cNvPr id="4" name="Slide Number Placeholder 3">
             <a:extLst>
               <a:ext uri="{FF2B5EF4-FFF2-40B4-BE49-F238E27FC236}">
-                <a16:creationId xmlns:a16="http://schemas.microsoft.com/office/drawing/2014/main" xmlns="" id="{EA0B9048-2C64-4BE9-A92C-F865D20F6DCA}"/>
+                <a16:creationId xmlns="" xmlns:a16="http://schemas.microsoft.com/office/drawing/2014/main" id="{EA0B9048-2C64-4BE9-A92C-F865D20F6DCA}"/>
               </a:ext>
             </a:extLst>
           </p:cNvPr>
@@ -4415,7 +4415,7 @@
           <p:cNvPr id="2" name="Title 1">
             <a:extLst>
               <a:ext uri="{FF2B5EF4-FFF2-40B4-BE49-F238E27FC236}">
-                <a16:creationId xmlns:a16="http://schemas.microsoft.com/office/drawing/2014/main" xmlns="" id="{8C032037-B949-413D-B2C5-8DB3F6DC0720}"/>
+                <a16:creationId xmlns="" xmlns:a16="http://schemas.microsoft.com/office/drawing/2014/main" id="{8C032037-B949-413D-B2C5-8DB3F6DC0720}"/>
               </a:ext>
             </a:extLst>
           </p:cNvPr>
@@ -4443,7 +4443,7 @@
           <p:cNvPr id="4" name="Slide Number Placeholder 3">
             <a:extLst>
               <a:ext uri="{FF2B5EF4-FFF2-40B4-BE49-F238E27FC236}">
-                <a16:creationId xmlns:a16="http://schemas.microsoft.com/office/drawing/2014/main" xmlns="" id="{0C1CCDEE-7880-4598-B7A4-620D56376A39}"/>
+                <a16:creationId xmlns="" xmlns:a16="http://schemas.microsoft.com/office/drawing/2014/main" id="{0C1CCDEE-7880-4598-B7A4-620D56376A39}"/>
               </a:ext>
             </a:extLst>
           </p:cNvPr>
@@ -4472,7 +4472,7 @@
           <p:cNvPr id="5" name="Rectangle: Rounded Corners 4">
             <a:extLst>
               <a:ext uri="{FF2B5EF4-FFF2-40B4-BE49-F238E27FC236}">
-                <a16:creationId xmlns:a16="http://schemas.microsoft.com/office/drawing/2014/main" xmlns="" id="{343079DB-B2DD-4DB9-8D06-E88EB7FA99E6}"/>
+                <a16:creationId xmlns="" xmlns:a16="http://schemas.microsoft.com/office/drawing/2014/main" id="{343079DB-B2DD-4DB9-8D06-E88EB7FA99E6}"/>
               </a:ext>
             </a:extLst>
           </p:cNvPr>
@@ -4583,7 +4583,7 @@
           <p:cNvPr id="7" name="Rectangle: Rounded Corners 4">
             <a:extLst>
               <a:ext uri="{FF2B5EF4-FFF2-40B4-BE49-F238E27FC236}">
-                <a16:creationId xmlns:a16="http://schemas.microsoft.com/office/drawing/2014/main" xmlns="" id="{343079DB-B2DD-4DB9-8D06-E88EB7FA99E6}"/>
+                <a16:creationId xmlns="" xmlns:a16="http://schemas.microsoft.com/office/drawing/2014/main" id="{343079DB-B2DD-4DB9-8D06-E88EB7FA99E6}"/>
               </a:ext>
             </a:extLst>
           </p:cNvPr>
@@ -4697,7 +4697,7 @@
           <p:cNvPr id="2" name="Title 1">
             <a:extLst>
               <a:ext uri="{FF2B5EF4-FFF2-40B4-BE49-F238E27FC236}">
-                <a16:creationId xmlns:a16="http://schemas.microsoft.com/office/drawing/2014/main" xmlns="" id="{8C032037-B949-413D-B2C5-8DB3F6DC0720}"/>
+                <a16:creationId xmlns="" xmlns:a16="http://schemas.microsoft.com/office/drawing/2014/main" id="{8C032037-B949-413D-B2C5-8DB3F6DC0720}"/>
               </a:ext>
             </a:extLst>
           </p:cNvPr>
@@ -4725,7 +4725,7 @@
           <p:cNvPr id="4" name="Slide Number Placeholder 3">
             <a:extLst>
               <a:ext uri="{FF2B5EF4-FFF2-40B4-BE49-F238E27FC236}">
-                <a16:creationId xmlns:a16="http://schemas.microsoft.com/office/drawing/2014/main" xmlns="" id="{0C1CCDEE-7880-4598-B7A4-620D56376A39}"/>
+                <a16:creationId xmlns="" xmlns:a16="http://schemas.microsoft.com/office/drawing/2014/main" id="{0C1CCDEE-7880-4598-B7A4-620D56376A39}"/>
               </a:ext>
             </a:extLst>
           </p:cNvPr>
@@ -4754,7 +4754,7 @@
           <p:cNvPr id="5" name="Rectangle: Rounded Corners 4">
             <a:extLst>
               <a:ext uri="{FF2B5EF4-FFF2-40B4-BE49-F238E27FC236}">
-                <a16:creationId xmlns:a16="http://schemas.microsoft.com/office/drawing/2014/main" xmlns="" id="{343079DB-B2DD-4DB9-8D06-E88EB7FA99E6}"/>
+                <a16:creationId xmlns="" xmlns:a16="http://schemas.microsoft.com/office/drawing/2014/main" id="{343079DB-B2DD-4DB9-8D06-E88EB7FA99E6}"/>
               </a:ext>
             </a:extLst>
           </p:cNvPr>
@@ -4812,7 +4812,7 @@
           <p:cNvPr id="7" name="Rectangle: Rounded Corners 4">
             <a:extLst>
               <a:ext uri="{FF2B5EF4-FFF2-40B4-BE49-F238E27FC236}">
-                <a16:creationId xmlns:a16="http://schemas.microsoft.com/office/drawing/2014/main" xmlns="" id="{343079DB-B2DD-4DB9-8D06-E88EB7FA99E6}"/>
+                <a16:creationId xmlns="" xmlns:a16="http://schemas.microsoft.com/office/drawing/2014/main" id="{343079DB-B2DD-4DB9-8D06-E88EB7FA99E6}"/>
               </a:ext>
             </a:extLst>
           </p:cNvPr>
@@ -4896,7 +4896,7 @@
           <p:cNvPr id="8" name="Rectangle: Rounded Corners 4">
             <a:extLst>
               <a:ext uri="{FF2B5EF4-FFF2-40B4-BE49-F238E27FC236}">
-                <a16:creationId xmlns:a16="http://schemas.microsoft.com/office/drawing/2014/main" xmlns="" id="{343079DB-B2DD-4DB9-8D06-E88EB7FA99E6}"/>
+                <a16:creationId xmlns="" xmlns:a16="http://schemas.microsoft.com/office/drawing/2014/main" id="{343079DB-B2DD-4DB9-8D06-E88EB7FA99E6}"/>
               </a:ext>
             </a:extLst>
           </p:cNvPr>
@@ -4963,7 +4963,7 @@
           <p:cNvPr id="9" name="Rectangle: Rounded Corners 4">
             <a:extLst>
               <a:ext uri="{FF2B5EF4-FFF2-40B4-BE49-F238E27FC236}">
-                <a16:creationId xmlns:a16="http://schemas.microsoft.com/office/drawing/2014/main" xmlns="" id="{343079DB-B2DD-4DB9-8D06-E88EB7FA99E6}"/>
+                <a16:creationId xmlns="" xmlns:a16="http://schemas.microsoft.com/office/drawing/2014/main" id="{343079DB-B2DD-4DB9-8D06-E88EB7FA99E6}"/>
               </a:ext>
             </a:extLst>
           </p:cNvPr>
@@ -5323,7 +5323,7 @@
           <p:cNvPr id="2" name="Title 1">
             <a:extLst>
               <a:ext uri="{FF2B5EF4-FFF2-40B4-BE49-F238E27FC236}">
-                <a16:creationId xmlns:a16="http://schemas.microsoft.com/office/drawing/2014/main" xmlns="" id="{B1DC0FCD-00AD-4F4E-B86E-590D18F4CF0A}"/>
+                <a16:creationId xmlns="" xmlns:a16="http://schemas.microsoft.com/office/drawing/2014/main" id="{B1DC0FCD-00AD-4F4E-B86E-590D18F4CF0A}"/>
               </a:ext>
             </a:extLst>
           </p:cNvPr>
@@ -5351,7 +5351,7 @@
           <p:cNvPr id="4" name="Slide Number Placeholder 3">
             <a:extLst>
               <a:ext uri="{FF2B5EF4-FFF2-40B4-BE49-F238E27FC236}">
-                <a16:creationId xmlns:a16="http://schemas.microsoft.com/office/drawing/2014/main" xmlns="" id="{37702A44-88D5-4B62-90EE-8F1380B5122D}"/>
+                <a16:creationId xmlns="" xmlns:a16="http://schemas.microsoft.com/office/drawing/2014/main" id="{37702A44-88D5-4B62-90EE-8F1380B5122D}"/>
               </a:ext>
             </a:extLst>
           </p:cNvPr>
@@ -5380,7 +5380,7 @@
           <p:cNvPr id="5" name="TextBox 4">
             <a:extLst>
               <a:ext uri="{FF2B5EF4-FFF2-40B4-BE49-F238E27FC236}">
-                <a16:creationId xmlns:a16="http://schemas.microsoft.com/office/drawing/2014/main" xmlns="" id="{1FBA6EE5-C61C-4C08-981E-526E9B105AB6}"/>
+                <a16:creationId xmlns="" xmlns:a16="http://schemas.microsoft.com/office/drawing/2014/main" id="{1FBA6EE5-C61C-4C08-981E-526E9B105AB6}"/>
               </a:ext>
             </a:extLst>
           </p:cNvPr>
@@ -5737,7 +5737,7 @@
           <p:cNvPr id="5" name="Rectangle: Rounded Corners 4">
             <a:extLst>
               <a:ext uri="{FF2B5EF4-FFF2-40B4-BE49-F238E27FC236}">
-                <a16:creationId xmlns:a16="http://schemas.microsoft.com/office/drawing/2014/main" xmlns="" id="{343079DB-B2DD-4DB9-8D06-E88EB7FA99E6}"/>
+                <a16:creationId xmlns="" xmlns:a16="http://schemas.microsoft.com/office/drawing/2014/main" id="{343079DB-B2DD-4DB9-8D06-E88EB7FA99E6}"/>
               </a:ext>
             </a:extLst>
           </p:cNvPr>
@@ -5795,7 +5795,7 @@
           <p:cNvPr id="7" name="Rectangle: Rounded Corners 4">
             <a:extLst>
               <a:ext uri="{FF2B5EF4-FFF2-40B4-BE49-F238E27FC236}">
-                <a16:creationId xmlns:a16="http://schemas.microsoft.com/office/drawing/2014/main" xmlns="" id="{343079DB-B2DD-4DB9-8D06-E88EB7FA99E6}"/>
+                <a16:creationId xmlns="" xmlns:a16="http://schemas.microsoft.com/office/drawing/2014/main" id="{343079DB-B2DD-4DB9-8D06-E88EB7FA99E6}"/>
               </a:ext>
             </a:extLst>
           </p:cNvPr>
@@ -5862,7 +5862,7 @@
           <p:cNvPr id="8" name="Rectangle: Rounded Corners 4">
             <a:extLst>
               <a:ext uri="{FF2B5EF4-FFF2-40B4-BE49-F238E27FC236}">
-                <a16:creationId xmlns:a16="http://schemas.microsoft.com/office/drawing/2014/main" xmlns="" id="{343079DB-B2DD-4DB9-8D06-E88EB7FA99E6}"/>
+                <a16:creationId xmlns="" xmlns:a16="http://schemas.microsoft.com/office/drawing/2014/main" id="{343079DB-B2DD-4DB9-8D06-E88EB7FA99E6}"/>
               </a:ext>
             </a:extLst>
           </p:cNvPr>
@@ -6291,7 +6291,7 @@
           <p:cNvPr id="17" name="Rectangle: Rounded Corners 4">
             <a:extLst>
               <a:ext uri="{FF2B5EF4-FFF2-40B4-BE49-F238E27FC236}">
-                <a16:creationId xmlns:a16="http://schemas.microsoft.com/office/drawing/2014/main" xmlns="" id="{49BBB581-511A-4C25-A59D-71D2ED436D77}"/>
+                <a16:creationId xmlns="" xmlns:a16="http://schemas.microsoft.com/office/drawing/2014/main" id="{49BBB581-511A-4C25-A59D-71D2ED436D77}"/>
               </a:ext>
             </a:extLst>
           </p:cNvPr>
@@ -6450,7 +6450,7 @@
           <p:cNvPr id="5" name="Rectangle: Rounded Corners 4">
             <a:extLst>
               <a:ext uri="{FF2B5EF4-FFF2-40B4-BE49-F238E27FC236}">
-                <a16:creationId xmlns:a16="http://schemas.microsoft.com/office/drawing/2014/main" xmlns="" id="{343079DB-B2DD-4DB9-8D06-E88EB7FA99E6}"/>
+                <a16:creationId xmlns="" xmlns:a16="http://schemas.microsoft.com/office/drawing/2014/main" id="{343079DB-B2DD-4DB9-8D06-E88EB7FA99E6}"/>
               </a:ext>
             </a:extLst>
           </p:cNvPr>
@@ -6508,7 +6508,7 @@
           <p:cNvPr id="328" name="Rectangle: Rounded Corners 4">
             <a:extLst>
               <a:ext uri="{FF2B5EF4-FFF2-40B4-BE49-F238E27FC236}">
-                <a16:creationId xmlns:a16="http://schemas.microsoft.com/office/drawing/2014/main" xmlns="" id="{343079DB-B2DD-4DB9-8D06-E88EB7FA99E6}"/>
+                <a16:creationId xmlns="" xmlns:a16="http://schemas.microsoft.com/office/drawing/2014/main" id="{343079DB-B2DD-4DB9-8D06-E88EB7FA99E6}"/>
               </a:ext>
             </a:extLst>
           </p:cNvPr>
@@ -6575,7 +6575,7 @@
           <p:cNvPr id="329" name="Rectangle: Rounded Corners 4">
             <a:extLst>
               <a:ext uri="{FF2B5EF4-FFF2-40B4-BE49-F238E27FC236}">
-                <a16:creationId xmlns:a16="http://schemas.microsoft.com/office/drawing/2014/main" xmlns="" id="{343079DB-B2DD-4DB9-8D06-E88EB7FA99E6}"/>
+                <a16:creationId xmlns="" xmlns:a16="http://schemas.microsoft.com/office/drawing/2014/main" id="{343079DB-B2DD-4DB9-8D06-E88EB7FA99E6}"/>
               </a:ext>
             </a:extLst>
           </p:cNvPr>
@@ -7120,7 +7120,7 @@
           <p:cNvPr id="20" name="Rectangle: Rounded Corners 4">
             <a:extLst>
               <a:ext uri="{FF2B5EF4-FFF2-40B4-BE49-F238E27FC236}">
-                <a16:creationId xmlns:a16="http://schemas.microsoft.com/office/drawing/2014/main" xmlns="" id="{220D45A1-6FAD-4417-A90D-016300F6A181}"/>
+                <a16:creationId xmlns="" xmlns:a16="http://schemas.microsoft.com/office/drawing/2014/main" id="{220D45A1-6FAD-4417-A90D-016300F6A181}"/>
               </a:ext>
             </a:extLst>
           </p:cNvPr>
@@ -7279,7 +7279,7 @@
           <p:cNvPr id="5" name="Rectangle: Rounded Corners 4">
             <a:extLst>
               <a:ext uri="{FF2B5EF4-FFF2-40B4-BE49-F238E27FC236}">
-                <a16:creationId xmlns:a16="http://schemas.microsoft.com/office/drawing/2014/main" xmlns="" id="{343079DB-B2DD-4DB9-8D06-E88EB7FA99E6}"/>
+                <a16:creationId xmlns="" xmlns:a16="http://schemas.microsoft.com/office/drawing/2014/main" id="{343079DB-B2DD-4DB9-8D06-E88EB7FA99E6}"/>
               </a:ext>
             </a:extLst>
           </p:cNvPr>
@@ -7337,7 +7337,7 @@
           <p:cNvPr id="7" name="Rectangle: Rounded Corners 4">
             <a:extLst>
               <a:ext uri="{FF2B5EF4-FFF2-40B4-BE49-F238E27FC236}">
-                <a16:creationId xmlns:a16="http://schemas.microsoft.com/office/drawing/2014/main" xmlns="" id="{343079DB-B2DD-4DB9-8D06-E88EB7FA99E6}"/>
+                <a16:creationId xmlns="" xmlns:a16="http://schemas.microsoft.com/office/drawing/2014/main" id="{343079DB-B2DD-4DB9-8D06-E88EB7FA99E6}"/>
               </a:ext>
             </a:extLst>
           </p:cNvPr>
@@ -7404,7 +7404,7 @@
           <p:cNvPr id="8" name="Rectangle: Rounded Corners 4">
             <a:extLst>
               <a:ext uri="{FF2B5EF4-FFF2-40B4-BE49-F238E27FC236}">
-                <a16:creationId xmlns:a16="http://schemas.microsoft.com/office/drawing/2014/main" xmlns="" id="{343079DB-B2DD-4DB9-8D06-E88EB7FA99E6}"/>
+                <a16:creationId xmlns="" xmlns:a16="http://schemas.microsoft.com/office/drawing/2014/main" id="{343079DB-B2DD-4DB9-8D06-E88EB7FA99E6}"/>
               </a:ext>
             </a:extLst>
           </p:cNvPr>
@@ -7728,7 +7728,7 @@
           <p:cNvPr id="328" name="Rectangle: Rounded Corners 4">
             <a:extLst>
               <a:ext uri="{FF2B5EF4-FFF2-40B4-BE49-F238E27FC236}">
-                <a16:creationId xmlns:a16="http://schemas.microsoft.com/office/drawing/2014/main" xmlns="" id="{343079DB-B2DD-4DB9-8D06-E88EB7FA99E6}"/>
+                <a16:creationId xmlns="" xmlns:a16="http://schemas.microsoft.com/office/drawing/2014/main" id="{343079DB-B2DD-4DB9-8D06-E88EB7FA99E6}"/>
               </a:ext>
             </a:extLst>
           </p:cNvPr>
@@ -7795,7 +7795,7 @@
           <p:cNvPr id="329" name="Rectangle: Rounded Corners 4">
             <a:extLst>
               <a:ext uri="{FF2B5EF4-FFF2-40B4-BE49-F238E27FC236}">
-                <a16:creationId xmlns:a16="http://schemas.microsoft.com/office/drawing/2014/main" xmlns="" id="{343079DB-B2DD-4DB9-8D06-E88EB7FA99E6}"/>
+                <a16:creationId xmlns="" xmlns:a16="http://schemas.microsoft.com/office/drawing/2014/main" id="{343079DB-B2DD-4DB9-8D06-E88EB7FA99E6}"/>
               </a:ext>
             </a:extLst>
           </p:cNvPr>
@@ -8379,7 +8379,7 @@
           <p:cNvPr id="29" name="Rectangle: Rounded Corners 4">
             <a:extLst>
               <a:ext uri="{FF2B5EF4-FFF2-40B4-BE49-F238E27FC236}">
-                <a16:creationId xmlns:a16="http://schemas.microsoft.com/office/drawing/2014/main" xmlns="" id="{8B49DC34-DE7B-4CF2-95B3-44560E0DBC05}"/>
+                <a16:creationId xmlns="" xmlns:a16="http://schemas.microsoft.com/office/drawing/2014/main" id="{8B49DC34-DE7B-4CF2-95B3-44560E0DBC05}"/>
               </a:ext>
             </a:extLst>
           </p:cNvPr>
@@ -8538,7 +8538,7 @@
           <p:cNvPr id="7" name="Rectangle: Rounded Corners 4">
             <a:extLst>
               <a:ext uri="{FF2B5EF4-FFF2-40B4-BE49-F238E27FC236}">
-                <a16:creationId xmlns:a16="http://schemas.microsoft.com/office/drawing/2014/main" xmlns="" id="{343079DB-B2DD-4DB9-8D06-E88EB7FA99E6}"/>
+                <a16:creationId xmlns="" xmlns:a16="http://schemas.microsoft.com/office/drawing/2014/main" id="{343079DB-B2DD-4DB9-8D06-E88EB7FA99E6}"/>
               </a:ext>
             </a:extLst>
           </p:cNvPr>
@@ -8641,7 +8641,7 @@
           <p:cNvPr id="328" name="Rectangle: Rounded Corners 4">
             <a:extLst>
               <a:ext uri="{FF2B5EF4-FFF2-40B4-BE49-F238E27FC236}">
-                <a16:creationId xmlns:a16="http://schemas.microsoft.com/office/drawing/2014/main" xmlns="" id="{343079DB-B2DD-4DB9-8D06-E88EB7FA99E6}"/>
+                <a16:creationId xmlns="" xmlns:a16="http://schemas.microsoft.com/office/drawing/2014/main" id="{343079DB-B2DD-4DB9-8D06-E88EB7FA99E6}"/>
               </a:ext>
             </a:extLst>
           </p:cNvPr>
@@ -9178,7 +9178,7 @@
           <p:cNvPr id="45" name="Rectangle: Rounded Corners 4">
             <a:extLst>
               <a:ext uri="{FF2B5EF4-FFF2-40B4-BE49-F238E27FC236}">
-                <a16:creationId xmlns:a16="http://schemas.microsoft.com/office/drawing/2014/main" xmlns="" id="{343079DB-B2DD-4DB9-8D06-E88EB7FA99E6}"/>
+                <a16:creationId xmlns="" xmlns:a16="http://schemas.microsoft.com/office/drawing/2014/main" id="{343079DB-B2DD-4DB9-8D06-E88EB7FA99E6}"/>
               </a:ext>
             </a:extLst>
           </p:cNvPr>
@@ -9492,7 +9492,7 @@
           <p:cNvPr id="61" name="Rectangle: Rounded Corners 4">
             <a:extLst>
               <a:ext uri="{FF2B5EF4-FFF2-40B4-BE49-F238E27FC236}">
-                <a16:creationId xmlns:a16="http://schemas.microsoft.com/office/drawing/2014/main" xmlns="" id="{343079DB-B2DD-4DB9-8D06-E88EB7FA99E6}"/>
+                <a16:creationId xmlns="" xmlns:a16="http://schemas.microsoft.com/office/drawing/2014/main" id="{343079DB-B2DD-4DB9-8D06-E88EB7FA99E6}"/>
               </a:ext>
             </a:extLst>
           </p:cNvPr>
@@ -9735,7 +9735,7 @@
           <p:cNvPr id="5" name="TextBox 4">
             <a:extLst>
               <a:ext uri="{FF2B5EF4-FFF2-40B4-BE49-F238E27FC236}">
-                <a16:creationId xmlns:a16="http://schemas.microsoft.com/office/drawing/2014/main" xmlns="" id="{85DF22AD-429E-4CE9-B82F-602EEAC0945E}"/>
+                <a16:creationId xmlns="" xmlns:a16="http://schemas.microsoft.com/office/drawing/2014/main" id="{85DF22AD-429E-4CE9-B82F-602EEAC0945E}"/>
               </a:ext>
             </a:extLst>
           </p:cNvPr>
@@ -9923,7 +9923,7 @@
           <p:cNvPr id="2" name="Title 1">
             <a:extLst>
               <a:ext uri="{FF2B5EF4-FFF2-40B4-BE49-F238E27FC236}">
-                <a16:creationId xmlns:a16="http://schemas.microsoft.com/office/drawing/2014/main" xmlns="" id="{42886002-7968-4C57-9D3B-5050682A9FF1}"/>
+                <a16:creationId xmlns="" xmlns:a16="http://schemas.microsoft.com/office/drawing/2014/main" id="{42886002-7968-4C57-9D3B-5050682A9FF1}"/>
               </a:ext>
             </a:extLst>
           </p:cNvPr>
@@ -9958,7 +9958,7 @@
           <p:cNvPr id="4" name="Slide Number Placeholder 3">
             <a:extLst>
               <a:ext uri="{FF2B5EF4-FFF2-40B4-BE49-F238E27FC236}">
-                <a16:creationId xmlns:a16="http://schemas.microsoft.com/office/drawing/2014/main" xmlns="" id="{0BEF4B0A-57A5-4B77-937E-17509878DA2A}"/>
+                <a16:creationId xmlns="" xmlns:a16="http://schemas.microsoft.com/office/drawing/2014/main" id="{0BEF4B0A-57A5-4B77-937E-17509878DA2A}"/>
               </a:ext>
             </a:extLst>
           </p:cNvPr>
@@ -9987,7 +9987,7 @@
           <p:cNvPr id="7" name="Picture 6" descr="A close up of a piece of paper&#10;&#10;Description automatically generated">
             <a:extLst>
               <a:ext uri="{FF2B5EF4-FFF2-40B4-BE49-F238E27FC236}">
-                <a16:creationId xmlns:a16="http://schemas.microsoft.com/office/drawing/2014/main" xmlns="" id="{AB8F38D6-CAC5-48E5-8676-5F95E930D8F9}"/>
+                <a16:creationId xmlns="" xmlns:a16="http://schemas.microsoft.com/office/drawing/2014/main" id="{AB8F38D6-CAC5-48E5-8676-5F95E930D8F9}"/>
               </a:ext>
             </a:extLst>
           </p:cNvPr>
@@ -10023,7 +10023,7 @@
           <p:cNvPr id="8" name="TextBox 7">
             <a:extLst>
               <a:ext uri="{FF2B5EF4-FFF2-40B4-BE49-F238E27FC236}">
-                <a16:creationId xmlns:a16="http://schemas.microsoft.com/office/drawing/2014/main" xmlns="" id="{9BAB3270-519A-4026-BF18-1E6FCD24CABD}"/>
+                <a16:creationId xmlns="" xmlns:a16="http://schemas.microsoft.com/office/drawing/2014/main" id="{9BAB3270-519A-4026-BF18-1E6FCD24CABD}"/>
               </a:ext>
             </a:extLst>
           </p:cNvPr>
@@ -10794,7 +10794,7 @@
           <p:cNvPr id="3" name="TextBox 2">
             <a:extLst>
               <a:ext uri="{FF2B5EF4-FFF2-40B4-BE49-F238E27FC236}">
-                <a16:creationId xmlns:a16="http://schemas.microsoft.com/office/drawing/2014/main" xmlns="" id="{894C8108-BD72-46B4-B6A2-A4CEF4D2E977}"/>
+                <a16:creationId xmlns="" xmlns:a16="http://schemas.microsoft.com/office/drawing/2014/main" id="{894C8108-BD72-46B4-B6A2-A4CEF4D2E977}"/>
               </a:ext>
             </a:extLst>
           </p:cNvPr>
@@ -10836,7 +10836,7 @@
           <p:cNvPr id="21" name="Straight Arrow Connector 20">
             <a:extLst>
               <a:ext uri="{FF2B5EF4-FFF2-40B4-BE49-F238E27FC236}">
-                <a16:creationId xmlns:a16="http://schemas.microsoft.com/office/drawing/2014/main" xmlns="" id="{8843D5DF-DD96-4A3A-8F70-CBD74AA0058C}"/>
+                <a16:creationId xmlns="" xmlns:a16="http://schemas.microsoft.com/office/drawing/2014/main" id="{8843D5DF-DD96-4A3A-8F70-CBD74AA0058C}"/>
               </a:ext>
             </a:extLst>
           </p:cNvPr>
@@ -11719,7 +11719,7 @@
           <p:cNvPr id="20" name="TextBox 19">
             <a:extLst>
               <a:ext uri="{FF2B5EF4-FFF2-40B4-BE49-F238E27FC236}">
-                <a16:creationId xmlns:a16="http://schemas.microsoft.com/office/drawing/2014/main" xmlns="" id="{3988C1E0-1A94-4263-9C9C-F4522EEBCA59}"/>
+                <a16:creationId xmlns="" xmlns:a16="http://schemas.microsoft.com/office/drawing/2014/main" id="{3988C1E0-1A94-4263-9C9C-F4522EEBCA59}"/>
               </a:ext>
             </a:extLst>
           </p:cNvPr>
@@ -11761,7 +11761,7 @@
           <p:cNvPr id="26" name="Straight Arrow Connector 25">
             <a:extLst>
               <a:ext uri="{FF2B5EF4-FFF2-40B4-BE49-F238E27FC236}">
-                <a16:creationId xmlns:a16="http://schemas.microsoft.com/office/drawing/2014/main" xmlns="" id="{B50A9574-CF29-4517-AA99-CFC66991180C}"/>
+                <a16:creationId xmlns="" xmlns:a16="http://schemas.microsoft.com/office/drawing/2014/main" id="{B50A9574-CF29-4517-AA99-CFC66991180C}"/>
               </a:ext>
             </a:extLst>
           </p:cNvPr>
@@ -11881,7 +11881,7 @@
           <p:cNvPr id="5" name="TextBox 4">
             <a:extLst>
               <a:ext uri="{FF2B5EF4-FFF2-40B4-BE49-F238E27FC236}">
-                <a16:creationId xmlns:a16="http://schemas.microsoft.com/office/drawing/2014/main" xmlns="" id="{8CC63340-435C-4935-8FFA-9176BC60ADB5}"/>
+                <a16:creationId xmlns="" xmlns:a16="http://schemas.microsoft.com/office/drawing/2014/main" id="{8CC63340-435C-4935-8FFA-9176BC60ADB5}"/>
               </a:ext>
             </a:extLst>
           </p:cNvPr>
@@ -11890,8 +11890,8 @@
         </p:nvSpPr>
         <p:spPr>
           <a:xfrm>
-            <a:off x="1097280" y="1181417"/>
-            <a:ext cx="10167182" cy="5078313"/>
+            <a:off x="1097280" y="1570295"/>
+            <a:ext cx="10167182" cy="4154984"/>
           </a:xfrm>
           <a:prstGeom prst="rect">
             <a:avLst/>
@@ -11925,9 +11925,10 @@
               <a:buAutoNum type="arabicPeriod"/>
             </a:pPr>
             <a:r>
-              <a:rPr lang="en-US" sz="2400" dirty="0"/>
-              <a:t>Look inside the .git folder. Find the index file.</a:t>
-            </a:r>
+              <a:rPr lang="en-US" sz="2400" dirty="0" smtClean="0"/>
+              <a:t>Take a commit from part 3 and create the “master” branch.</a:t>
+            </a:r>
+            <a:endParaRPr lang="en-US" sz="2400" dirty="0"/>
           </a:p>
           <a:p>
             <a:pPr marL="114300" indent="-457200">
@@ -11938,12 +11939,21 @@
               <a:buAutoNum type="arabicPeriod"/>
             </a:pPr>
             <a:r>
-              <a:rPr lang="en-US" sz="2400" dirty="0"/>
-              <a:t>Check the contents of the index with a plumbing command.</a:t>
-            </a:r>
-          </a:p>
-          <a:p>
-            <a:pPr marL="1028700" lvl="2" indent="-457200">
+              <a:rPr lang="en-US" sz="2400" dirty="0" smtClean="0"/>
+              <a:t>Find the branch inside the .</a:t>
+            </a:r>
+            <a:r>
+              <a:rPr lang="en-US" sz="2400" dirty="0" err="1" smtClean="0"/>
+              <a:t>git</a:t>
+            </a:r>
+            <a:r>
+              <a:rPr lang="en-US" sz="2400" dirty="0" smtClean="0"/>
+              <a:t>/refs directory</a:t>
+            </a:r>
+            <a:endParaRPr lang="en-US" sz="2400" dirty="0"/>
+          </a:p>
+          <a:p>
+            <a:pPr marL="457200" indent="-457200">
               <a:buClr>
                 <a:schemeClr val="tx2"/>
               </a:buClr>
@@ -11951,26 +11961,17 @@
               <a:buAutoNum type="arabicPeriod"/>
             </a:pPr>
             <a:r>
-              <a:rPr lang="en-US" sz="2400" dirty="0"/>
-              <a:t>Use </a:t>
-            </a:r>
-            <a:r>
-              <a:rPr lang="en-US" sz="2400" dirty="0">
-                <a:latin typeface="Courier New" panose="02070309020205020404" pitchFamily="49" charset="0"/>
-                <a:cs typeface="Courier New" panose="02070309020205020404" pitchFamily="49" charset="0"/>
-              </a:rPr>
-              <a:t>git status</a:t>
-            </a:r>
-            <a:r>
-              <a:rPr lang="en-US" sz="2400" dirty="0">
-                <a:cs typeface="Courier New" panose="02070309020205020404" pitchFamily="49" charset="0"/>
-              </a:rPr>
-              <a:t> to confirm the contents of the index.</a:t>
+              <a:rPr lang="en-US" sz="2400" dirty="0" smtClean="0"/>
+              <a:t>Create a new commit and check that master hasn’t changed. </a:t>
+            </a:r>
+            <a:r>
+              <a:rPr lang="en-US" sz="2400" dirty="0" smtClean="0"/>
+              <a:t>Advance master to the newest commit.</a:t>
             </a:r>
             <a:endParaRPr lang="en-US" sz="2400" dirty="0"/>
           </a:p>
           <a:p>
-            <a:pPr marL="114300" indent="-457200">
+            <a:pPr marL="457200" indent="-457200">
               <a:buClr>
                 <a:schemeClr val="tx2"/>
               </a:buClr>
@@ -11978,55 +11979,10 @@
               <a:buAutoNum type="arabicPeriod"/>
             </a:pPr>
             <a:r>
-              <a:rPr lang="en-US" sz="2400" dirty="0"/>
-              <a:t>Save the index as a tree in the object database. Find the file in the database.</a:t>
-            </a:r>
-          </a:p>
-          <a:p>
-            <a:pPr marL="114300" indent="-457200">
-              <a:buClr>
-                <a:schemeClr val="tx2"/>
-              </a:buClr>
-              <a:buFont typeface="+mj-lt"/>
-              <a:buAutoNum type="arabicPeriod"/>
-            </a:pPr>
-            <a:r>
-              <a:rPr lang="en-US" sz="2400" dirty="0"/>
-              <a:t>Look at the contents of the tree object. Make sure you understand each line.</a:t>
-            </a:r>
-          </a:p>
-          <a:p>
-            <a:pPr marL="114300" indent="-457200">
-              <a:buClr>
-                <a:schemeClr val="tx2"/>
-              </a:buClr>
-              <a:buFont typeface="+mj-lt"/>
-              <a:buAutoNum type="arabicPeriod"/>
-            </a:pPr>
-            <a:endParaRPr lang="en-US" dirty="0"/>
-          </a:p>
-          <a:p>
-            <a:pPr>
-              <a:buClr>
-                <a:schemeClr val="tx2"/>
-              </a:buClr>
-            </a:pPr>
-            <a:r>
-              <a:rPr lang="en-US" sz="2400" dirty="0">
-                <a:solidFill>
-                  <a:schemeClr val="tx2"/>
-                </a:solidFill>
-              </a:rPr>
-              <a:t>Repeat 1-5 until you are comfortable saving trees to the database</a:t>
-            </a:r>
-          </a:p>
-          <a:p>
-            <a:pPr>
-              <a:buClr>
-                <a:schemeClr val="tx2"/>
-              </a:buClr>
-            </a:pPr>
-            <a:endParaRPr lang="en-US" dirty="0"/>
+              <a:rPr lang="en-US" sz="2400" dirty="0" smtClean="0"/>
+              <a:t>Create a second branch. Add some more commits, and advance this branch to the newest commit.</a:t>
+            </a:r>
+            <a:endParaRPr lang="en-US" dirty="0" smtClean="0"/>
           </a:p>
           <a:p>
             <a:pPr marL="457200" indent="-457200">
@@ -12037,34 +11993,8 @@
               <a:buAutoNum type="arabicPeriod" startAt="6"/>
             </a:pPr>
             <a:r>
-              <a:rPr lang="en-US" sz="2400" dirty="0"/>
-              <a:t>Change a file and add it to the index. Save the tree to the object database.</a:t>
-            </a:r>
-          </a:p>
-          <a:p>
-            <a:pPr marL="1028700" lvl="2" indent="-457200">
-              <a:buClr>
-                <a:schemeClr val="tx2"/>
-              </a:buClr>
-              <a:buFont typeface="+mj-lt"/>
-              <a:buAutoNum type="arabicPeriod"/>
-            </a:pPr>
-            <a:r>
-              <a:rPr lang="en-US" sz="2400" dirty="0"/>
-              <a:t>What do you expect to be the contents of the tree?</a:t>
-            </a:r>
-          </a:p>
-          <a:p>
-            <a:pPr marL="1028700" lvl="2" indent="-457200">
-              <a:buClr>
-                <a:schemeClr val="tx2"/>
-              </a:buClr>
-              <a:buFont typeface="+mj-lt"/>
-              <a:buAutoNum type="arabicPeriod"/>
-            </a:pPr>
-            <a:r>
-              <a:rPr lang="en-US" sz="2400" dirty="0"/>
-              <a:t>Inspect the object file. Were you right?</a:t>
+              <a:rPr lang="en-US" sz="2400" dirty="0" smtClean="0"/>
+              <a:t>Create a lightweight tag on the most recent commit.</a:t>
             </a:r>
           </a:p>
           <a:p>
@@ -12076,9 +12006,45 @@
               <a:buAutoNum type="arabicPeriod" startAt="6"/>
             </a:pPr>
             <a:r>
-              <a:rPr lang="en-US" sz="2400" dirty="0"/>
-              <a:t>Save a subdirectory with files to your database. Inspect both the root tree and subtree. Make sure you understand each of the trees’ contents.</a:t>
-            </a:r>
+              <a:rPr lang="en-US" sz="2400" dirty="0" smtClean="0"/>
+              <a:t>Create an annotated tag on the same commit referred to by master.</a:t>
+            </a:r>
+          </a:p>
+          <a:p>
+            <a:pPr marL="457200" indent="-457200">
+              <a:buClr>
+                <a:schemeClr val="tx2"/>
+              </a:buClr>
+              <a:buFont typeface="+mj-lt"/>
+              <a:buAutoNum type="arabicPeriod" startAt="6"/>
+            </a:pPr>
+            <a:endParaRPr lang="en-US" sz="2400" dirty="0" smtClean="0"/>
+          </a:p>
+          <a:p>
+            <a:pPr marL="457200" indent="-457200">
+              <a:buClr>
+                <a:schemeClr val="tx2"/>
+              </a:buClr>
+              <a:buFont typeface="+mj-lt"/>
+              <a:buAutoNum type="arabicPeriod" startAt="6"/>
+            </a:pPr>
+            <a:r>
+              <a:rPr lang="en-US" sz="2400" i="1" dirty="0" smtClean="0"/>
+              <a:t>Bonus:</a:t>
+            </a:r>
+            <a:r>
+              <a:rPr lang="en-US" sz="2400" dirty="0" smtClean="0"/>
+              <a:t> Try to delete a branch using only file manipulation in the .</a:t>
+            </a:r>
+            <a:r>
+              <a:rPr lang="en-US" sz="2400" dirty="0" err="1" smtClean="0"/>
+              <a:t>git</a:t>
+            </a:r>
+            <a:r>
+              <a:rPr lang="en-US" sz="2400" dirty="0" smtClean="0"/>
+              <a:t> directory</a:t>
+            </a:r>
+            <a:endParaRPr lang="en-US" sz="2400" i="1" dirty="0"/>
           </a:p>
         </p:txBody>
       </p:sp>
@@ -12117,7 +12083,7 @@
           <p:cNvPr id="2" name="Title 1">
             <a:extLst>
               <a:ext uri="{FF2B5EF4-FFF2-40B4-BE49-F238E27FC236}">
-                <a16:creationId xmlns:a16="http://schemas.microsoft.com/office/drawing/2014/main" xmlns="" id="{D166370A-642D-4FD1-881C-A8E946F7E982}"/>
+                <a16:creationId xmlns="" xmlns:a16="http://schemas.microsoft.com/office/drawing/2014/main" id="{D166370A-642D-4FD1-881C-A8E946F7E982}"/>
               </a:ext>
             </a:extLst>
           </p:cNvPr>
@@ -12146,7 +12112,7 @@
           <p:cNvPr id="4" name="Slide Number Placeholder 3">
             <a:extLst>
               <a:ext uri="{FF2B5EF4-FFF2-40B4-BE49-F238E27FC236}">
-                <a16:creationId xmlns:a16="http://schemas.microsoft.com/office/drawing/2014/main" xmlns="" id="{F4A118D0-947D-4621-A436-67F7733A8210}"/>
+                <a16:creationId xmlns="" xmlns:a16="http://schemas.microsoft.com/office/drawing/2014/main" id="{F4A118D0-947D-4621-A436-67F7733A8210}"/>
               </a:ext>
             </a:extLst>
           </p:cNvPr>
@@ -12205,7 +12171,7 @@
           <p:cNvPr id="2" name="Title 1">
             <a:extLst>
               <a:ext uri="{FF2B5EF4-FFF2-40B4-BE49-F238E27FC236}">
-                <a16:creationId xmlns:a16="http://schemas.microsoft.com/office/drawing/2014/main" xmlns="" id="{D166370A-642D-4FD1-881C-A8E946F7E982}"/>
+                <a16:creationId xmlns="" xmlns:a16="http://schemas.microsoft.com/office/drawing/2014/main" id="{D166370A-642D-4FD1-881C-A8E946F7E982}"/>
               </a:ext>
             </a:extLst>
           </p:cNvPr>
@@ -12234,7 +12200,7 @@
           <p:cNvPr id="4" name="Slide Number Placeholder 3">
             <a:extLst>
               <a:ext uri="{FF2B5EF4-FFF2-40B4-BE49-F238E27FC236}">
-                <a16:creationId xmlns:a16="http://schemas.microsoft.com/office/drawing/2014/main" xmlns="" id="{F4A118D0-947D-4621-A436-67F7733A8210}"/>
+                <a16:creationId xmlns="" xmlns:a16="http://schemas.microsoft.com/office/drawing/2014/main" id="{F4A118D0-947D-4621-A436-67F7733A8210}"/>
               </a:ext>
             </a:extLst>
           </p:cNvPr>
@@ -12293,7 +12259,7 @@
           <p:cNvPr id="2" name="Title 1">
             <a:extLst>
               <a:ext uri="{FF2B5EF4-FFF2-40B4-BE49-F238E27FC236}">
-                <a16:creationId xmlns:a16="http://schemas.microsoft.com/office/drawing/2014/main" xmlns="" id="{42886002-7968-4C57-9D3B-5050682A9FF1}"/>
+                <a16:creationId xmlns="" xmlns:a16="http://schemas.microsoft.com/office/drawing/2014/main" id="{42886002-7968-4C57-9D3B-5050682A9FF1}"/>
               </a:ext>
             </a:extLst>
           </p:cNvPr>
@@ -12328,7 +12294,7 @@
           <p:cNvPr id="4" name="Slide Number Placeholder 3">
             <a:extLst>
               <a:ext uri="{FF2B5EF4-FFF2-40B4-BE49-F238E27FC236}">
-                <a16:creationId xmlns:a16="http://schemas.microsoft.com/office/drawing/2014/main" xmlns="" id="{0BEF4B0A-57A5-4B77-937E-17509878DA2A}"/>
+                <a16:creationId xmlns="" xmlns:a16="http://schemas.microsoft.com/office/drawing/2014/main" id="{0BEF4B0A-57A5-4B77-937E-17509878DA2A}"/>
               </a:ext>
             </a:extLst>
           </p:cNvPr>
@@ -12357,7 +12323,7 @@
           <p:cNvPr id="7" name="Picture 6" descr="A close up of a piece of paper&#10;&#10;Description automatically generated">
             <a:extLst>
               <a:ext uri="{FF2B5EF4-FFF2-40B4-BE49-F238E27FC236}">
-                <a16:creationId xmlns:a16="http://schemas.microsoft.com/office/drawing/2014/main" xmlns="" id="{AB8F38D6-CAC5-48E5-8676-5F95E930D8F9}"/>
+                <a16:creationId xmlns="" xmlns:a16="http://schemas.microsoft.com/office/drawing/2014/main" id="{AB8F38D6-CAC5-48E5-8676-5F95E930D8F9}"/>
               </a:ext>
             </a:extLst>
           </p:cNvPr>
@@ -12393,7 +12359,7 @@
           <p:cNvPr id="8" name="TextBox 7">
             <a:extLst>
               <a:ext uri="{FF2B5EF4-FFF2-40B4-BE49-F238E27FC236}">
-                <a16:creationId xmlns:a16="http://schemas.microsoft.com/office/drawing/2014/main" xmlns="" id="{9BAB3270-519A-4026-BF18-1E6FCD24CABD}"/>
+                <a16:creationId xmlns="" xmlns:a16="http://schemas.microsoft.com/office/drawing/2014/main" id="{9BAB3270-519A-4026-BF18-1E6FCD24CABD}"/>
               </a:ext>
             </a:extLst>
           </p:cNvPr>
@@ -12432,7 +12398,7 @@
           <p:cNvPr id="9" name="TextBox 8">
             <a:extLst>
               <a:ext uri="{FF2B5EF4-FFF2-40B4-BE49-F238E27FC236}">
-                <a16:creationId xmlns:a16="http://schemas.microsoft.com/office/drawing/2014/main" xmlns="" id="{7C416ACF-9461-4F17-AB75-61FE28059B98}"/>
+                <a16:creationId xmlns="" xmlns:a16="http://schemas.microsoft.com/office/drawing/2014/main" id="{7C416ACF-9461-4F17-AB75-61FE28059B98}"/>
               </a:ext>
             </a:extLst>
           </p:cNvPr>
@@ -12534,7 +12500,7 @@
           <p:cNvPr id="10" name="TextBox 9">
             <a:extLst>
               <a:ext uri="{FF2B5EF4-FFF2-40B4-BE49-F238E27FC236}">
-                <a16:creationId xmlns:a16="http://schemas.microsoft.com/office/drawing/2014/main" xmlns="" id="{B5B524CB-10F7-4875-B7E7-867F62B03441}"/>
+                <a16:creationId xmlns="" xmlns:a16="http://schemas.microsoft.com/office/drawing/2014/main" id="{B5B524CB-10F7-4875-B7E7-867F62B03441}"/>
               </a:ext>
             </a:extLst>
           </p:cNvPr>
@@ -12600,7 +12566,7 @@
           <p:cNvPr id="2" name="Title 1">
             <a:extLst>
               <a:ext uri="{FF2B5EF4-FFF2-40B4-BE49-F238E27FC236}">
-                <a16:creationId xmlns:a16="http://schemas.microsoft.com/office/drawing/2014/main" xmlns="" id="{42886002-7968-4C57-9D3B-5050682A9FF1}"/>
+                <a16:creationId xmlns="" xmlns:a16="http://schemas.microsoft.com/office/drawing/2014/main" id="{42886002-7968-4C57-9D3B-5050682A9FF1}"/>
               </a:ext>
             </a:extLst>
           </p:cNvPr>
@@ -12635,7 +12601,7 @@
           <p:cNvPr id="4" name="Slide Number Placeholder 3">
             <a:extLst>
               <a:ext uri="{FF2B5EF4-FFF2-40B4-BE49-F238E27FC236}">
-                <a16:creationId xmlns:a16="http://schemas.microsoft.com/office/drawing/2014/main" xmlns="" id="{0BEF4B0A-57A5-4B77-937E-17509878DA2A}"/>
+                <a16:creationId xmlns="" xmlns:a16="http://schemas.microsoft.com/office/drawing/2014/main" id="{0BEF4B0A-57A5-4B77-937E-17509878DA2A}"/>
               </a:ext>
             </a:extLst>
           </p:cNvPr>
@@ -12664,7 +12630,7 @@
           <p:cNvPr id="7" name="Picture 6" descr="A close up of a piece of paper&#10;&#10;Description automatically generated">
             <a:extLst>
               <a:ext uri="{FF2B5EF4-FFF2-40B4-BE49-F238E27FC236}">
-                <a16:creationId xmlns:a16="http://schemas.microsoft.com/office/drawing/2014/main" xmlns="" id="{AB8F38D6-CAC5-48E5-8676-5F95E930D8F9}"/>
+                <a16:creationId xmlns="" xmlns:a16="http://schemas.microsoft.com/office/drawing/2014/main" id="{AB8F38D6-CAC5-48E5-8676-5F95E930D8F9}"/>
               </a:ext>
             </a:extLst>
           </p:cNvPr>
@@ -12700,7 +12666,7 @@
           <p:cNvPr id="8" name="TextBox 7">
             <a:extLst>
               <a:ext uri="{FF2B5EF4-FFF2-40B4-BE49-F238E27FC236}">
-                <a16:creationId xmlns:a16="http://schemas.microsoft.com/office/drawing/2014/main" xmlns="" id="{9BAB3270-519A-4026-BF18-1E6FCD24CABD}"/>
+                <a16:creationId xmlns="" xmlns:a16="http://schemas.microsoft.com/office/drawing/2014/main" id="{9BAB3270-519A-4026-BF18-1E6FCD24CABD}"/>
               </a:ext>
             </a:extLst>
           </p:cNvPr>
@@ -12739,7 +12705,7 @@
           <p:cNvPr id="9" name="TextBox 8">
             <a:extLst>
               <a:ext uri="{FF2B5EF4-FFF2-40B4-BE49-F238E27FC236}">
-                <a16:creationId xmlns:a16="http://schemas.microsoft.com/office/drawing/2014/main" xmlns="" id="{7C416ACF-9461-4F17-AB75-61FE28059B98}"/>
+                <a16:creationId xmlns="" xmlns:a16="http://schemas.microsoft.com/office/drawing/2014/main" id="{7C416ACF-9461-4F17-AB75-61FE28059B98}"/>
               </a:ext>
             </a:extLst>
           </p:cNvPr>
@@ -12841,7 +12807,7 @@
           <p:cNvPr id="10" name="TextBox 9">
             <a:extLst>
               <a:ext uri="{FF2B5EF4-FFF2-40B4-BE49-F238E27FC236}">
-                <a16:creationId xmlns:a16="http://schemas.microsoft.com/office/drawing/2014/main" xmlns="" id="{B5B524CB-10F7-4875-B7E7-867F62B03441}"/>
+                <a16:creationId xmlns="" xmlns:a16="http://schemas.microsoft.com/office/drawing/2014/main" id="{B5B524CB-10F7-4875-B7E7-867F62B03441}"/>
               </a:ext>
             </a:extLst>
           </p:cNvPr>
@@ -12877,7 +12843,7 @@
           <p:cNvPr id="11" name="TextBox 10">
             <a:extLst>
               <a:ext uri="{FF2B5EF4-FFF2-40B4-BE49-F238E27FC236}">
-                <a16:creationId xmlns:a16="http://schemas.microsoft.com/office/drawing/2014/main" xmlns="" id="{3C556B3D-4BA3-4FA5-A42A-389B12606726}"/>
+                <a16:creationId xmlns="" xmlns:a16="http://schemas.microsoft.com/office/drawing/2014/main" id="{3C556B3D-4BA3-4FA5-A42A-389B12606726}"/>
               </a:ext>
             </a:extLst>
           </p:cNvPr>
@@ -12981,7 +12947,7 @@
           <p:cNvPr id="2" name="Title 1">
             <a:extLst>
               <a:ext uri="{FF2B5EF4-FFF2-40B4-BE49-F238E27FC236}">
-                <a16:creationId xmlns:a16="http://schemas.microsoft.com/office/drawing/2014/main" xmlns="" id="{D2D75DF4-2269-45CF-9EFB-9DCA33227BF0}"/>
+                <a16:creationId xmlns="" xmlns:a16="http://schemas.microsoft.com/office/drawing/2014/main" id="{D2D75DF4-2269-45CF-9EFB-9DCA33227BF0}"/>
               </a:ext>
             </a:extLst>
           </p:cNvPr>
@@ -13009,7 +12975,7 @@
           <p:cNvPr id="4" name="Slide Number Placeholder 3">
             <a:extLst>
               <a:ext uri="{FF2B5EF4-FFF2-40B4-BE49-F238E27FC236}">
-                <a16:creationId xmlns:a16="http://schemas.microsoft.com/office/drawing/2014/main" xmlns="" id="{2DA943FC-87A8-4C71-906F-1A57E8F3E862}"/>
+                <a16:creationId xmlns="" xmlns:a16="http://schemas.microsoft.com/office/drawing/2014/main" id="{2DA943FC-87A8-4C71-906F-1A57E8F3E862}"/>
               </a:ext>
             </a:extLst>
           </p:cNvPr>
@@ -13038,7 +13004,7 @@
           <p:cNvPr id="6" name="Picture 5" descr="A close up of a map&#10;&#10;Description automatically generated">
             <a:extLst>
               <a:ext uri="{FF2B5EF4-FFF2-40B4-BE49-F238E27FC236}">
-                <a16:creationId xmlns:a16="http://schemas.microsoft.com/office/drawing/2014/main" xmlns="" id="{6B2B336C-68C4-4E8C-8787-C91EEEACDFCF}"/>
+                <a16:creationId xmlns="" xmlns:a16="http://schemas.microsoft.com/office/drawing/2014/main" id="{6B2B336C-68C4-4E8C-8787-C91EEEACDFCF}"/>
               </a:ext>
             </a:extLst>
           </p:cNvPr>
@@ -13076,7 +13042,7 @@
           <p:cNvPr id="7" name="TextBox 6">
             <a:extLst>
               <a:ext uri="{FF2B5EF4-FFF2-40B4-BE49-F238E27FC236}">
-                <a16:creationId xmlns:a16="http://schemas.microsoft.com/office/drawing/2014/main" xmlns="" id="{6B6BC618-9F1A-4E94-ACFC-C01E61EC0148}"/>
+                <a16:creationId xmlns="" xmlns:a16="http://schemas.microsoft.com/office/drawing/2014/main" id="{6B6BC618-9F1A-4E94-ACFC-C01E61EC0148}"/>
               </a:ext>
             </a:extLst>
           </p:cNvPr>
@@ -13148,7 +13114,7 @@
           <p:cNvPr id="9" name="Straight Arrow Connector 8">
             <a:extLst>
               <a:ext uri="{FF2B5EF4-FFF2-40B4-BE49-F238E27FC236}">
-                <a16:creationId xmlns:a16="http://schemas.microsoft.com/office/drawing/2014/main" xmlns="" id="{B10AAF6B-02E3-442F-AC80-BFC5C84ECA41}"/>
+                <a16:creationId xmlns="" xmlns:a16="http://schemas.microsoft.com/office/drawing/2014/main" id="{B10AAF6B-02E3-442F-AC80-BFC5C84ECA41}"/>
               </a:ext>
             </a:extLst>
           </p:cNvPr>
@@ -13193,7 +13159,7 @@
           <p:cNvPr id="11" name="TextBox 10">
             <a:extLst>
               <a:ext uri="{FF2B5EF4-FFF2-40B4-BE49-F238E27FC236}">
-                <a16:creationId xmlns:a16="http://schemas.microsoft.com/office/drawing/2014/main" xmlns="" id="{A51C1665-D8B0-4952-9734-6F3E013B8A53}"/>
+                <a16:creationId xmlns="" xmlns:a16="http://schemas.microsoft.com/office/drawing/2014/main" id="{A51C1665-D8B0-4952-9734-6F3E013B8A53}"/>
               </a:ext>
             </a:extLst>
           </p:cNvPr>
@@ -13240,7 +13206,7 @@
           <p:cNvPr id="13" name="Straight Arrow Connector 12">
             <a:extLst>
               <a:ext uri="{FF2B5EF4-FFF2-40B4-BE49-F238E27FC236}">
-                <a16:creationId xmlns:a16="http://schemas.microsoft.com/office/drawing/2014/main" xmlns="" id="{AE47E85D-0682-498E-816B-D5718A50238B}"/>
+                <a16:creationId xmlns="" xmlns:a16="http://schemas.microsoft.com/office/drawing/2014/main" id="{AE47E85D-0682-498E-816B-D5718A50238B}"/>
               </a:ext>
             </a:extLst>
           </p:cNvPr>
@@ -13315,7 +13281,7 @@
           <p:cNvPr id="2" name="Title 1">
             <a:extLst>
               <a:ext uri="{FF2B5EF4-FFF2-40B4-BE49-F238E27FC236}">
-                <a16:creationId xmlns:a16="http://schemas.microsoft.com/office/drawing/2014/main" xmlns="" id="{D2D75DF4-2269-45CF-9EFB-9DCA33227BF0}"/>
+                <a16:creationId xmlns="" xmlns:a16="http://schemas.microsoft.com/office/drawing/2014/main" id="{D2D75DF4-2269-45CF-9EFB-9DCA33227BF0}"/>
               </a:ext>
             </a:extLst>
           </p:cNvPr>
@@ -13343,7 +13309,7 @@
           <p:cNvPr id="4" name="Slide Number Placeholder 3">
             <a:extLst>
               <a:ext uri="{FF2B5EF4-FFF2-40B4-BE49-F238E27FC236}">
-                <a16:creationId xmlns:a16="http://schemas.microsoft.com/office/drawing/2014/main" xmlns="" id="{2DA943FC-87A8-4C71-906F-1A57E8F3E862}"/>
+                <a16:creationId xmlns="" xmlns:a16="http://schemas.microsoft.com/office/drawing/2014/main" id="{2DA943FC-87A8-4C71-906F-1A57E8F3E862}"/>
               </a:ext>
             </a:extLst>
           </p:cNvPr>
@@ -13372,7 +13338,7 @@
           <p:cNvPr id="6" name="Picture 5" descr="A close up of a map&#10;&#10;Description automatically generated">
             <a:extLst>
               <a:ext uri="{FF2B5EF4-FFF2-40B4-BE49-F238E27FC236}">
-                <a16:creationId xmlns:a16="http://schemas.microsoft.com/office/drawing/2014/main" xmlns="" id="{6B2B336C-68C4-4E8C-8787-C91EEEACDFCF}"/>
+                <a16:creationId xmlns="" xmlns:a16="http://schemas.microsoft.com/office/drawing/2014/main" id="{6B2B336C-68C4-4E8C-8787-C91EEEACDFCF}"/>
               </a:ext>
             </a:extLst>
           </p:cNvPr>
@@ -13410,7 +13376,7 @@
           <p:cNvPr id="7" name="TextBox 6">
             <a:extLst>
               <a:ext uri="{FF2B5EF4-FFF2-40B4-BE49-F238E27FC236}">
-                <a16:creationId xmlns:a16="http://schemas.microsoft.com/office/drawing/2014/main" xmlns="" id="{6B6BC618-9F1A-4E94-ACFC-C01E61EC0148}"/>
+                <a16:creationId xmlns="" xmlns:a16="http://schemas.microsoft.com/office/drawing/2014/main" id="{6B6BC618-9F1A-4E94-ACFC-C01E61EC0148}"/>
               </a:ext>
             </a:extLst>
           </p:cNvPr>
@@ -13482,7 +13448,7 @@
           <p:cNvPr id="9" name="Straight Arrow Connector 8">
             <a:extLst>
               <a:ext uri="{FF2B5EF4-FFF2-40B4-BE49-F238E27FC236}">
-                <a16:creationId xmlns:a16="http://schemas.microsoft.com/office/drawing/2014/main" xmlns="" id="{B10AAF6B-02E3-442F-AC80-BFC5C84ECA41}"/>
+                <a16:creationId xmlns="" xmlns:a16="http://schemas.microsoft.com/office/drawing/2014/main" id="{B10AAF6B-02E3-442F-AC80-BFC5C84ECA41}"/>
               </a:ext>
             </a:extLst>
           </p:cNvPr>
@@ -13527,7 +13493,7 @@
           <p:cNvPr id="11" name="TextBox 10">
             <a:extLst>
               <a:ext uri="{FF2B5EF4-FFF2-40B4-BE49-F238E27FC236}">
-                <a16:creationId xmlns:a16="http://schemas.microsoft.com/office/drawing/2014/main" xmlns="" id="{A51C1665-D8B0-4952-9734-6F3E013B8A53}"/>
+                <a16:creationId xmlns="" xmlns:a16="http://schemas.microsoft.com/office/drawing/2014/main" id="{A51C1665-D8B0-4952-9734-6F3E013B8A53}"/>
               </a:ext>
             </a:extLst>
           </p:cNvPr>
@@ -13574,7 +13540,7 @@
           <p:cNvPr id="13" name="Straight Arrow Connector 12">
             <a:extLst>
               <a:ext uri="{FF2B5EF4-FFF2-40B4-BE49-F238E27FC236}">
-                <a16:creationId xmlns:a16="http://schemas.microsoft.com/office/drawing/2014/main" xmlns="" id="{AE47E85D-0682-498E-816B-D5718A50238B}"/>
+                <a16:creationId xmlns="" xmlns:a16="http://schemas.microsoft.com/office/drawing/2014/main" id="{AE47E85D-0682-498E-816B-D5718A50238B}"/>
               </a:ext>
             </a:extLst>
           </p:cNvPr>
@@ -13619,7 +13585,7 @@
           <p:cNvPr id="17" name="TextBox 16">
             <a:extLst>
               <a:ext uri="{FF2B5EF4-FFF2-40B4-BE49-F238E27FC236}">
-                <a16:creationId xmlns:a16="http://schemas.microsoft.com/office/drawing/2014/main" xmlns="" id="{E082C26B-58D5-4835-9D2B-39A6C7247F1F}"/>
+                <a16:creationId xmlns="" xmlns:a16="http://schemas.microsoft.com/office/drawing/2014/main" id="{E082C26B-58D5-4835-9D2B-39A6C7247F1F}"/>
               </a:ext>
             </a:extLst>
           </p:cNvPr>
@@ -13839,7 +13805,7 @@
           <p:cNvPr id="2" name="Title 1">
             <a:extLst>
               <a:ext uri="{FF2B5EF4-FFF2-40B4-BE49-F238E27FC236}">
-                <a16:creationId xmlns:a16="http://schemas.microsoft.com/office/drawing/2014/main" xmlns="" id="{892D1B40-7D69-46BF-A0A2-6041C5C0A357}"/>
+                <a16:creationId xmlns="" xmlns:a16="http://schemas.microsoft.com/office/drawing/2014/main" id="{892D1B40-7D69-46BF-A0A2-6041C5C0A357}"/>
               </a:ext>
             </a:extLst>
           </p:cNvPr>
@@ -13867,7 +13833,7 @@
           <p:cNvPr id="4" name="Slide Number Placeholder 3">
             <a:extLst>
               <a:ext uri="{FF2B5EF4-FFF2-40B4-BE49-F238E27FC236}">
-                <a16:creationId xmlns:a16="http://schemas.microsoft.com/office/drawing/2014/main" xmlns="" id="{8CF80C52-C2CD-441D-8B6C-5BF5B2541557}"/>
+                <a16:creationId xmlns="" xmlns:a16="http://schemas.microsoft.com/office/drawing/2014/main" id="{8CF80C52-C2CD-441D-8B6C-5BF5B2541557}"/>
               </a:ext>
             </a:extLst>
           </p:cNvPr>
@@ -13903,7 +13869,7 @@
           <p:cNvPr id="5" name="TextBox 4">
             <a:extLst>
               <a:ext uri="{FF2B5EF4-FFF2-40B4-BE49-F238E27FC236}">
-                <a16:creationId xmlns:a16="http://schemas.microsoft.com/office/drawing/2014/main" xmlns="" id="{F75E499E-50F3-4CAF-867D-443E2B34D9E4}"/>
+                <a16:creationId xmlns="" xmlns:a16="http://schemas.microsoft.com/office/drawing/2014/main" id="{F75E499E-50F3-4CAF-867D-443E2B34D9E4}"/>
               </a:ext>
             </a:extLst>
           </p:cNvPr>
@@ -14027,7 +13993,7 @@
           <p:cNvPr id="2" name="Title 1">
             <a:extLst>
               <a:ext uri="{FF2B5EF4-FFF2-40B4-BE49-F238E27FC236}">
-                <a16:creationId xmlns:a16="http://schemas.microsoft.com/office/drawing/2014/main" xmlns="" id="{4687C10C-D6C8-45E2-805F-F60B82C7E187}"/>
+                <a16:creationId xmlns="" xmlns:a16="http://schemas.microsoft.com/office/drawing/2014/main" id="{4687C10C-D6C8-45E2-805F-F60B82C7E187}"/>
               </a:ext>
             </a:extLst>
           </p:cNvPr>
@@ -14056,7 +14022,7 @@
           <p:cNvPr id="4" name="Slide Number Placeholder 3">
             <a:extLst>
               <a:ext uri="{FF2B5EF4-FFF2-40B4-BE49-F238E27FC236}">
-                <a16:creationId xmlns:a16="http://schemas.microsoft.com/office/drawing/2014/main" xmlns="" id="{8A4740C5-EDEC-4877-BB25-6E7078E2D385}"/>
+                <a16:creationId xmlns="" xmlns:a16="http://schemas.microsoft.com/office/drawing/2014/main" id="{8A4740C5-EDEC-4877-BB25-6E7078E2D385}"/>
               </a:ext>
             </a:extLst>
           </p:cNvPr>
@@ -14115,7 +14081,7 @@
           <p:cNvPr id="2" name="Title 1">
             <a:extLst>
               <a:ext uri="{FF2B5EF4-FFF2-40B4-BE49-F238E27FC236}">
-                <a16:creationId xmlns:a16="http://schemas.microsoft.com/office/drawing/2014/main" xmlns="" id="{681B9910-2B4E-4768-A8A6-7A1D8B47E9C8}"/>
+                <a16:creationId xmlns="" xmlns:a16="http://schemas.microsoft.com/office/drawing/2014/main" id="{681B9910-2B4E-4768-A8A6-7A1D8B47E9C8}"/>
               </a:ext>
             </a:extLst>
           </p:cNvPr>
@@ -14145,7 +14111,7 @@
           <p:cNvPr id="4" name="Slide Number Placeholder 3">
             <a:extLst>
               <a:ext uri="{FF2B5EF4-FFF2-40B4-BE49-F238E27FC236}">
-                <a16:creationId xmlns:a16="http://schemas.microsoft.com/office/drawing/2014/main" xmlns="" id="{C85F9710-7E1B-48C7-8D70-E6E64335C011}"/>
+                <a16:creationId xmlns="" xmlns:a16="http://schemas.microsoft.com/office/drawing/2014/main" id="{C85F9710-7E1B-48C7-8D70-E6E64335C011}"/>
               </a:ext>
             </a:extLst>
           </p:cNvPr>
@@ -14174,7 +14140,7 @@
           <p:cNvPr id="3" name="TextBox 2">
             <a:extLst>
               <a:ext uri="{FF2B5EF4-FFF2-40B4-BE49-F238E27FC236}">
-                <a16:creationId xmlns:a16="http://schemas.microsoft.com/office/drawing/2014/main" xmlns="" id="{56BCC580-B380-4384-AF94-213375D8413D}"/>
+                <a16:creationId xmlns="" xmlns:a16="http://schemas.microsoft.com/office/drawing/2014/main" id="{56BCC580-B380-4384-AF94-213375D8413D}"/>
               </a:ext>
             </a:extLst>
           </p:cNvPr>
@@ -14377,7 +14343,7 @@
           <p:cNvPr id="14" name="Freeform: Shape 13">
             <a:extLst>
               <a:ext uri="{FF2B5EF4-FFF2-40B4-BE49-F238E27FC236}">
-                <a16:creationId xmlns:a16="http://schemas.microsoft.com/office/drawing/2014/main" xmlns="" id="{98D685DD-6F77-4CF2-9CE3-47F623190ECA}"/>
+                <a16:creationId xmlns="" xmlns:a16="http://schemas.microsoft.com/office/drawing/2014/main" id="{98D685DD-6F77-4CF2-9CE3-47F623190ECA}"/>
               </a:ext>
             </a:extLst>
           </p:cNvPr>
@@ -14469,7 +14435,7 @@
           <p:cNvPr id="15" name="TextBox 14">
             <a:extLst>
               <a:ext uri="{FF2B5EF4-FFF2-40B4-BE49-F238E27FC236}">
-                <a16:creationId xmlns:a16="http://schemas.microsoft.com/office/drawing/2014/main" xmlns="" id="{DEE487F3-2275-42FC-9868-8EF0EF4E74A2}"/>
+                <a16:creationId xmlns="" xmlns:a16="http://schemas.microsoft.com/office/drawing/2014/main" id="{DEE487F3-2275-42FC-9868-8EF0EF4E74A2}"/>
               </a:ext>
             </a:extLst>
           </p:cNvPr>

</xml_diff>